<commit_message>
#8 Helpful extensions - slides.
</commit_message>
<xml_diff>
--- a/slides/Kotlin - 3. Collections.pptx
+++ b/slides/Kotlin - 3. Collections.pptx
@@ -10,13 +10,13 @@
   <p:sldIdLst>
     <p:sldId id="311" r:id="rId2"/>
     <p:sldId id="355" r:id="rId3"/>
-    <p:sldId id="361" r:id="rId4"/>
-    <p:sldId id="363" r:id="rId5"/>
-    <p:sldId id="357" r:id="rId6"/>
-    <p:sldId id="358" r:id="rId7"/>
-    <p:sldId id="362" r:id="rId8"/>
-    <p:sldId id="359" r:id="rId9"/>
-    <p:sldId id="360" r:id="rId10"/>
+    <p:sldId id="356" r:id="rId4"/>
+    <p:sldId id="357" r:id="rId5"/>
+    <p:sldId id="358" r:id="rId6"/>
+    <p:sldId id="359" r:id="rId7"/>
+    <p:sldId id="360" r:id="rId8"/>
+    <p:sldId id="361" r:id="rId9"/>
+    <p:sldId id="362" r:id="rId10"/>
     <p:sldId id="312" r:id="rId11"/>
     <p:sldId id="298" r:id="rId12"/>
   </p:sldIdLst>
@@ -241,7 +241,7 @@
             <a:fld id="{B7CEC25C-B4E9-458D-8E4B-2C06A129DA19}" type="datetimeFigureOut">
               <a:rPr lang="cs-CZ" smtClean="0"/>
               <a:pPr/>
-              <a:t>18.02.2019</a:t>
+              <a:t>19.02.2019</a:t>
             </a:fld>
             <a:endParaRPr lang="cs-CZ"/>
           </a:p>
@@ -9484,36 +9484,6 @@
       </p:grpSpPr>
       <p:sp>
         <p:nvSpPr>
-          <p:cNvPr id="13" name="Podnadpis 12"/>
-          <p:cNvSpPr>
-            <a:spLocks noGrp="1"/>
-          </p:cNvSpPr>
-          <p:nvPr>
-            <p:ph type="subTitle" idx="1"/>
-          </p:nvPr>
-        </p:nvSpPr>
-        <p:spPr/>
-        <p:txBody>
-          <a:bodyPr anchor="b" anchorCtr="0"/>
-          <a:lstStyle/>
-          <a:p>
-            <a:r>
-              <a:rPr lang="en-US" dirty="0" smtClean="0"/>
-              <a:t>Marcel Matula, V</a:t>
-            </a:r>
-            <a:r>
-              <a:rPr lang="cs-CZ" dirty="0" err="1" smtClean="0"/>
-              <a:t>ít</a:t>
-            </a:r>
-            <a:r>
-              <a:rPr lang="cs-CZ" dirty="0" smtClean="0"/>
-              <a:t> Kluganost, Jaromír Rokusek</a:t>
-            </a:r>
-          </a:p>
-        </p:txBody>
-      </p:sp>
-      <p:sp>
-        <p:nvSpPr>
           <p:cNvPr id="4" name="Zástupný symbol pro text 3"/>
           <p:cNvSpPr>
             <a:spLocks noGrp="1"/>
@@ -9565,7 +9535,11 @@
             </a:r>
             <a:r>
               <a:rPr lang="cs-CZ" dirty="0" smtClean="0"/>
-              <a:t>– zaškolení pro ČSOB Java komunitu</a:t>
+              <a:t>– </a:t>
+            </a:r>
+            <a:r>
+              <a:rPr lang="en-US" dirty="0" smtClean="0"/>
+              <a:t>Collections</a:t>
             </a:r>
             <a:endParaRPr lang="cs-CZ" dirty="0"/>
           </a:p>
@@ -9880,7 +9854,7 @@
     </p:spTree>
     <p:extLst>
       <p:ext uri="{BB962C8B-B14F-4D97-AF65-F5344CB8AC3E}">
-        <p14:creationId xmlns:p14="http://schemas.microsoft.com/office/powerpoint/2010/main" val="3212313030"/>
+        <p14:creationId xmlns:p14="http://schemas.microsoft.com/office/powerpoint/2010/main" val="2850781372"/>
       </p:ext>
     </p:extLst>
   </p:cSld>
@@ -10069,11 +10043,7 @@
             <a:pPr lvl="1"/>
             <a:r>
               <a:rPr lang="cs-CZ" dirty="0"/>
-              <a:t>forEachIndexed</a:t>
-            </a:r>
-            <a:r>
-              <a:rPr lang="cs-CZ" dirty="0"/>
-              <a:t> { index, i -&gt;  </a:t>
+              <a:t>forEachIndexed { index, i -&gt;  </a:t>
             </a:r>
             <a:r>
               <a:rPr lang="cs-CZ" dirty="0" smtClean="0"/>
@@ -10088,7 +10058,7 @@
     </p:spTree>
     <p:extLst>
       <p:ext uri="{BB962C8B-B14F-4D97-AF65-F5344CB8AC3E}">
-        <p14:creationId xmlns:p14="http://schemas.microsoft.com/office/powerpoint/2010/main" val="329004824"/>
+        <p14:creationId xmlns:p14="http://schemas.microsoft.com/office/powerpoint/2010/main" val="1196865599"/>
       </p:ext>
     </p:extLst>
   </p:cSld>
@@ -10585,7 +10555,6 @@
               <a:rPr lang="cs-CZ" dirty="0" smtClean="0"/>
               <a:t>Transformace</a:t>
             </a:r>
-            <a:endParaRPr lang="cs-CZ" dirty="0" smtClean="0"/>
           </a:p>
           <a:p>
             <a:pPr lvl="1"/>
@@ -10609,7 +10578,6 @@
               <a:rPr lang="cs-CZ" dirty="0" smtClean="0"/>
               <a:t>}</a:t>
             </a:r>
-            <a:endParaRPr lang="cs-CZ" dirty="0" smtClean="0"/>
           </a:p>
           <a:p>
             <a:pPr lvl="1"/>
@@ -10633,7 +10601,6 @@
               <a:rPr lang="cs-CZ" dirty="0" smtClean="0"/>
               <a:t>}</a:t>
             </a:r>
-            <a:endParaRPr lang="cs-CZ" dirty="0" smtClean="0"/>
           </a:p>
           <a:p>
             <a:pPr lvl="1"/>
@@ -11066,7 +11033,7 @@
     </p:spTree>
     <p:extLst>
       <p:ext uri="{BB962C8B-B14F-4D97-AF65-F5344CB8AC3E}">
-        <p14:creationId xmlns:p14="http://schemas.microsoft.com/office/powerpoint/2010/main" val="900081376"/>
+        <p14:creationId xmlns:p14="http://schemas.microsoft.com/office/powerpoint/2010/main" val="4257225991"/>
       </p:ext>
     </p:extLst>
   </p:cSld>
@@ -12114,7 +12081,7 @@
     </p:spTree>
     <p:extLst>
       <p:ext uri="{BB962C8B-B14F-4D97-AF65-F5344CB8AC3E}">
-        <p14:creationId xmlns:p14="http://schemas.microsoft.com/office/powerpoint/2010/main" val="1935295592"/>
+        <p14:creationId xmlns:p14="http://schemas.microsoft.com/office/powerpoint/2010/main" val="3671685946"/>
       </p:ext>
     </p:extLst>
   </p:cSld>
@@ -12883,33 +12850,15 @@
                                   </p:childTnLst>
                                 </p:cTn>
                               </p:par>
-                            </p:childTnLst>
-                          </p:cTn>
-                        </p:par>
-                      </p:childTnLst>
-                    </p:cTn>
-                  </p:par>
-                  <p:par>
-                    <p:cTn id="59" fill="hold">
-                      <p:stCondLst>
-                        <p:cond delay="indefinite"/>
-                      </p:stCondLst>
-                      <p:childTnLst>
-                        <p:par>
-                          <p:cTn id="60" fill="hold">
-                            <p:stCondLst>
-                              <p:cond delay="0"/>
-                            </p:stCondLst>
-                            <p:childTnLst>
                               <p:par>
-                                <p:cTn id="61" presetID="10" presetClass="entr" presetSubtype="0" fill="hold" nodeType="clickEffect">
+                                <p:cTn id="59" presetID="10" presetClass="entr" presetSubtype="0" fill="hold" nodeType="withEffect">
                                   <p:stCondLst>
                                     <p:cond delay="0"/>
                                   </p:stCondLst>
                                   <p:childTnLst>
                                     <p:set>
                                       <p:cBhvr>
-                                        <p:cTn id="62" dur="1" fill="hold">
+                                        <p:cTn id="60" dur="1" fill="hold">
                                           <p:stCondLst>
                                             <p:cond delay="0"/>
                                           </p:stCondLst>
@@ -12931,7 +12880,7 @@
                                     </p:set>
                                     <p:animEffect transition="in" filter="fade">
                                       <p:cBhvr>
-                                        <p:cTn id="63" dur="500"/>
+                                        <p:cTn id="61" dur="500"/>
                                         <p:tgtEl>
                                           <p:spTgt spid="3">
                                             <p:txEl>
@@ -13116,11 +13065,8 @@
             </a:r>
             <a:r>
               <a:rPr lang="cs-CZ" dirty="0" smtClean="0"/>
-              <a:t>	</a:t>
-            </a:r>
-          </a:p>
-          <a:p>
-            <a:pPr lvl="1"/>
+              <a:t>, </a:t>
+            </a:r>
             <a:r>
               <a:rPr lang="cs-CZ" dirty="0" err="1" smtClean="0"/>
               <a:t>mapValues</a:t>
@@ -13133,10 +13079,10 @@
               <a:rPr lang="cs-CZ" dirty="0" err="1" smtClean="0"/>
               <a:t>filterKeys</a:t>
             </a:r>
-            <a:endParaRPr lang="cs-CZ" dirty="0" smtClean="0"/>
-          </a:p>
-          <a:p>
-            <a:pPr lvl="1"/>
+            <a:r>
+              <a:rPr lang="cs-CZ" dirty="0" smtClean="0"/>
+              <a:t>, </a:t>
+            </a:r>
             <a:r>
               <a:rPr lang="cs-CZ" dirty="0" err="1" smtClean="0"/>
               <a:t>filterValues</a:t>
@@ -13148,6 +13094,34 @@
             <a:r>
               <a:rPr lang="cs-CZ" dirty="0" err="1" smtClean="0"/>
               <a:t>asIterable</a:t>
+            </a:r>
+            <a:endParaRPr lang="cs-CZ" dirty="0" smtClean="0"/>
+          </a:p>
+          <a:p>
+            <a:pPr lvl="1"/>
+            <a:r>
+              <a:rPr lang="cs-CZ" dirty="0" err="1" smtClean="0"/>
+              <a:t>getOrPut</a:t>
+            </a:r>
+            <a:r>
+              <a:rPr lang="en-US" dirty="0" smtClean="0"/>
+              <a:t>(“key”)</a:t>
+            </a:r>
+            <a:r>
+              <a:rPr lang="cs-CZ" dirty="0" smtClean="0"/>
+              <a:t> </a:t>
+            </a:r>
+            <a:r>
+              <a:rPr lang="en-US" dirty="0" smtClean="0"/>
+              <a:t>{ </a:t>
+            </a:r>
+            <a:r>
+              <a:rPr lang="en-US" dirty="0" err="1" smtClean="0"/>
+              <a:t>defaultValue</a:t>
+            </a:r>
+            <a:r>
+              <a:rPr lang="en-US" dirty="0" smtClean="0"/>
+              <a:t> }</a:t>
             </a:r>
             <a:endParaRPr lang="cs-CZ" dirty="0" smtClean="0"/>
           </a:p>
@@ -13257,7 +13231,7 @@
     </p:spTree>
     <p:extLst>
       <p:ext uri="{BB962C8B-B14F-4D97-AF65-F5344CB8AC3E}">
-        <p14:creationId xmlns:p14="http://schemas.microsoft.com/office/powerpoint/2010/main" val="2028050364"/>
+        <p14:creationId xmlns:p14="http://schemas.microsoft.com/office/powerpoint/2010/main" val="208979744"/>
       </p:ext>
     </p:extLst>
   </p:cSld>
@@ -13818,15 +13792,33 @@
                                   </p:childTnLst>
                                 </p:cTn>
                               </p:par>
+                            </p:childTnLst>
+                          </p:cTn>
+                        </p:par>
+                      </p:childTnLst>
+                    </p:cTn>
+                  </p:par>
+                  <p:par>
+                    <p:cTn id="43" fill="hold">
+                      <p:stCondLst>
+                        <p:cond delay="indefinite"/>
+                      </p:stCondLst>
+                      <p:childTnLst>
+                        <p:par>
+                          <p:cTn id="44" fill="hold">
+                            <p:stCondLst>
+                              <p:cond delay="0"/>
+                            </p:stCondLst>
+                            <p:childTnLst>
                               <p:par>
-                                <p:cTn id="43" presetID="10" presetClass="entr" presetSubtype="0" fill="hold" nodeType="withEffect">
+                                <p:cTn id="45" presetID="10" presetClass="entr" presetSubtype="0" fill="hold" nodeType="clickEffect">
                                   <p:stCondLst>
                                     <p:cond delay="0"/>
                                   </p:stCondLst>
                                   <p:childTnLst>
                                     <p:set>
                                       <p:cBhvr>
-                                        <p:cTn id="44" dur="1" fill="hold">
+                                        <p:cTn id="46" dur="1" fill="hold">
                                           <p:stCondLst>
                                             <p:cond delay="0"/>
                                           </p:stCondLst>
@@ -13848,7 +13840,7 @@
                                     </p:set>
                                     <p:animEffect transition="in" filter="fade">
                                       <p:cBhvr>
-                                        <p:cTn id="45" dur="500"/>
+                                        <p:cTn id="47" dur="500"/>
                                         <p:tgtEl>
                                           <p:spTgt spid="3">
                                             <p:txEl>
@@ -13861,26 +13853,8 @@
                                   </p:childTnLst>
                                 </p:cTn>
                               </p:par>
-                            </p:childTnLst>
-                          </p:cTn>
-                        </p:par>
-                      </p:childTnLst>
-                    </p:cTn>
-                  </p:par>
-                  <p:par>
-                    <p:cTn id="46" fill="hold">
-                      <p:stCondLst>
-                        <p:cond delay="indefinite"/>
-                      </p:stCondLst>
-                      <p:childTnLst>
-                        <p:par>
-                          <p:cTn id="47" fill="hold">
-                            <p:stCondLst>
-                              <p:cond delay="0"/>
-                            </p:stCondLst>
-                            <p:childTnLst>
                               <p:par>
-                                <p:cTn id="48" presetID="10" presetClass="entr" presetSubtype="0" fill="hold" nodeType="clickEffect">
+                                <p:cTn id="48" presetID="10" presetClass="entr" presetSubtype="0" fill="hold" nodeType="withEffect">
                                   <p:stCondLst>
                                     <p:cond delay="0"/>
                                   </p:stCondLst>
@@ -14051,49 +14025,6 @@
                                   </p:childTnLst>
                                 </p:cTn>
                               </p:par>
-                              <p:par>
-                                <p:cTn id="60" presetID="10" presetClass="entr" presetSubtype="0" fill="hold" nodeType="withEffect">
-                                  <p:stCondLst>
-                                    <p:cond delay="0"/>
-                                  </p:stCondLst>
-                                  <p:childTnLst>
-                                    <p:set>
-                                      <p:cBhvr>
-                                        <p:cTn id="61" dur="1" fill="hold">
-                                          <p:stCondLst>
-                                            <p:cond delay="0"/>
-                                          </p:stCondLst>
-                                        </p:cTn>
-                                        <p:tgtEl>
-                                          <p:spTgt spid="3">
-                                            <p:txEl>
-                                              <p:pRg st="17" end="17"/>
-                                            </p:txEl>
-                                          </p:spTgt>
-                                        </p:tgtEl>
-                                        <p:attrNameLst>
-                                          <p:attrName>style.visibility</p:attrName>
-                                        </p:attrNameLst>
-                                      </p:cBhvr>
-                                      <p:to>
-                                        <p:strVal val="visible"/>
-                                      </p:to>
-                                    </p:set>
-                                    <p:animEffect transition="in" filter="fade">
-                                      <p:cBhvr>
-                                        <p:cTn id="62" dur="500"/>
-                                        <p:tgtEl>
-                                          <p:spTgt spid="3">
-                                            <p:txEl>
-                                              <p:pRg st="17" end="17"/>
-                                            </p:txEl>
-                                          </p:spTgt>
-                                        </p:tgtEl>
-                                      </p:cBhvr>
-                                    </p:animEffect>
-                                  </p:childTnLst>
-                                </p:cTn>
-                              </p:par>
                             </p:childTnLst>
                           </p:cTn>
                         </p:par>
@@ -14463,7 +14394,7 @@
     </p:spTree>
     <p:extLst>
       <p:ext uri="{BB962C8B-B14F-4D97-AF65-F5344CB8AC3E}">
-        <p14:creationId xmlns:p14="http://schemas.microsoft.com/office/powerpoint/2010/main" val="3089703971"/>
+        <p14:creationId xmlns:p14="http://schemas.microsoft.com/office/powerpoint/2010/main" val="2491465986"/>
       </p:ext>
     </p:extLst>
   </p:cSld>
@@ -15485,7 +15416,7 @@
     </p:spTree>
     <p:extLst>
       <p:ext uri="{BB962C8B-B14F-4D97-AF65-F5344CB8AC3E}">
-        <p14:creationId xmlns:p14="http://schemas.microsoft.com/office/powerpoint/2010/main" val="1982777090"/>
+        <p14:creationId xmlns:p14="http://schemas.microsoft.com/office/powerpoint/2010/main" val="1172999130"/>
       </p:ext>
     </p:extLst>
   </p:cSld>

</xml_diff>

<commit_message>
kotlin advanced - collections examples added
</commit_message>
<xml_diff>
--- a/slides/Kotlin - 3. Collections.pptx
+++ b/slides/Kotlin - 3. Collections.pptx
@@ -5,7 +5,7 @@
     <p:sldMasterId id="2147483648" r:id="rId1"/>
   </p:sldMasterIdLst>
   <p:notesMasterIdLst>
-    <p:notesMasterId r:id="rId13"/>
+    <p:notesMasterId r:id="rId14"/>
   </p:notesMasterIdLst>
   <p:sldIdLst>
     <p:sldId id="311" r:id="rId2"/>
@@ -17,8 +17,9 @@
     <p:sldId id="360" r:id="rId8"/>
     <p:sldId id="361" r:id="rId9"/>
     <p:sldId id="362" r:id="rId10"/>
-    <p:sldId id="312" r:id="rId11"/>
-    <p:sldId id="298" r:id="rId12"/>
+    <p:sldId id="363" r:id="rId11"/>
+    <p:sldId id="312" r:id="rId12"/>
+    <p:sldId id="298" r:id="rId13"/>
   </p:sldIdLst>
   <p:sldSz cx="9144000" cy="6858000" type="screen4x3"/>
   <p:notesSz cx="6858000" cy="9144000"/>
@@ -119,7 +120,7 @@
   </p:defaultTextStyle>
   <p:extLst>
     <p:ext uri="{EFAFB233-063F-42B5-8137-9DF3F51BA10A}">
-      <p15:sldGuideLst xmlns:p15="http://schemas.microsoft.com/office/powerpoint/2012/main" xmlns="">
+      <p15:sldGuideLst xmlns:p15="http://schemas.microsoft.com/office/powerpoint/2012/main">
         <p15:guide id="1" orient="horz" pos="2160">
           <p15:clr>
             <a:srgbClr val="A4A3A4"/>
@@ -133,7 +134,7 @@
       </p15:sldGuideLst>
     </p:ext>
     <p:ext uri="{2D200454-40CA-4A62-9FC3-DE9A4176ACB9}">
-      <p15:notesGuideLst xmlns:p15="http://schemas.microsoft.com/office/powerpoint/2012/main" xmlns="">
+      <p15:notesGuideLst xmlns:p15="http://schemas.microsoft.com/office/powerpoint/2012/main">
         <p15:guide id="1" orient="horz" pos="2880">
           <p15:clr>
             <a:srgbClr val="A4A3A4"/>
@@ -241,7 +242,7 @@
             <a:fld id="{B7CEC25C-B4E9-458D-8E4B-2C06A129DA19}" type="datetimeFigureOut">
               <a:rPr lang="cs-CZ" smtClean="0"/>
               <a:pPr/>
-              <a:t>19.02.2019</a:t>
+              <a:t>25.02.2019</a:t>
             </a:fld>
             <a:endParaRPr lang="cs-CZ"/>
           </a:p>
@@ -9584,6 +9585,747 @@
       </p:grpSpPr>
       <p:sp>
         <p:nvSpPr>
+          <p:cNvPr id="2" name="Nadpis 1"/>
+          <p:cNvSpPr>
+            <a:spLocks noGrp="1"/>
+          </p:cNvSpPr>
+          <p:nvPr>
+            <p:ph type="title"/>
+          </p:nvPr>
+        </p:nvSpPr>
+        <p:spPr/>
+        <p:txBody>
+          <a:bodyPr/>
+          <a:lstStyle/>
+          <a:p>
+            <a:r>
+              <a:rPr lang="en-US" dirty="0" err="1" smtClean="0"/>
+              <a:t>Sekvence</a:t>
+            </a:r>
+            <a:endParaRPr lang="cs-CZ" dirty="0"/>
+          </a:p>
+        </p:txBody>
+      </p:sp>
+      <p:sp>
+        <p:nvSpPr>
+          <p:cNvPr id="3" name="Zástupný symbol pro text 2"/>
+          <p:cNvSpPr>
+            <a:spLocks noGrp="1"/>
+          </p:cNvSpPr>
+          <p:nvPr>
+            <p:ph type="body" sz="quarter" idx="13"/>
+          </p:nvPr>
+        </p:nvSpPr>
+        <p:spPr>
+          <a:xfrm>
+            <a:off x="323528" y="1052735"/>
+            <a:ext cx="7560840" cy="1512169"/>
+          </a:xfrm>
+        </p:spPr>
+        <p:txBody>
+          <a:bodyPr/>
+          <a:lstStyle/>
+          <a:p>
+            <a:r>
+              <a:rPr lang="en-US" dirty="0" err="1"/>
+              <a:t>Vytvo</a:t>
+            </a:r>
+            <a:r>
+              <a:rPr lang="cs-CZ" dirty="0" err="1"/>
+              <a:t>ření</a:t>
+            </a:r>
+            <a:endParaRPr lang="cs-CZ" dirty="0"/>
+          </a:p>
+          <a:p>
+            <a:pPr lvl="1"/>
+            <a:r>
+              <a:rPr lang="cs-CZ" dirty="0" err="1"/>
+              <a:t>sequenceOf</a:t>
+            </a:r>
+            <a:endParaRPr lang="en-US" dirty="0"/>
+          </a:p>
+          <a:p>
+            <a:pPr lvl="1"/>
+            <a:r>
+              <a:rPr lang="cs-CZ" dirty="0" err="1"/>
+              <a:t>asSequence</a:t>
+            </a:r>
+            <a:endParaRPr lang="cs-CZ" dirty="0"/>
+          </a:p>
+          <a:p>
+            <a:pPr lvl="1"/>
+            <a:r>
+              <a:rPr lang="cs-CZ" dirty="0" err="1"/>
+              <a:t>generateSequence</a:t>
+            </a:r>
+            <a:r>
+              <a:rPr lang="en-US" dirty="0"/>
+              <a:t>(</a:t>
+            </a:r>
+            <a:r>
+              <a:rPr lang="fr-FR" dirty="0"/>
+              <a:t>seed: T?, nextFunction: (T) -&gt; T?</a:t>
+            </a:r>
+            <a:r>
+              <a:rPr lang="en-US" dirty="0"/>
+              <a:t>)</a:t>
+            </a:r>
+            <a:r>
+              <a:rPr lang="cs-CZ" dirty="0"/>
+              <a:t> : </a:t>
+            </a:r>
+            <a:r>
+              <a:rPr lang="cs-CZ" dirty="0" err="1"/>
+              <a:t>Sequence</a:t>
+            </a:r>
+            <a:r>
+              <a:rPr lang="cs-CZ" dirty="0"/>
+              <a:t>&lt;T&gt;</a:t>
+            </a:r>
+          </a:p>
+          <a:p>
+            <a:endParaRPr lang="cs-CZ" dirty="0"/>
+          </a:p>
+        </p:txBody>
+      </p:sp>
+      <p:sp>
+        <p:nvSpPr>
+          <p:cNvPr id="4" name="Rectangle 1"/>
+          <p:cNvSpPr>
+            <a:spLocks noChangeArrowheads="1"/>
+          </p:cNvSpPr>
+          <p:nvPr/>
+        </p:nvSpPr>
+        <p:spPr bwMode="auto">
+          <a:xfrm>
+            <a:off x="323528" y="2933711"/>
+            <a:ext cx="2316660" cy="338554"/>
+          </a:xfrm>
+          <a:prstGeom prst="rect">
+            <a:avLst/>
+          </a:prstGeom>
+          <a:solidFill>
+            <a:srgbClr val="FFFFFF"/>
+          </a:solidFill>
+          <a:ln>
+            <a:noFill/>
+          </a:ln>
+          <a:effectLst/>
+          <a:extLst>
+            <a:ext uri="{91240B29-F687-4F45-9708-019B960494DF}">
+              <a14:hiddenLine xmlns:a14="http://schemas.microsoft.com/office/drawing/2010/main" w="9525">
+                <a:solidFill>
+                  <a:schemeClr val="tx1"/>
+                </a:solidFill>
+                <a:miter lim="800000"/>
+                <a:headEnd/>
+                <a:tailEnd/>
+              </a14:hiddenLine>
+            </a:ext>
+            <a:ext uri="{AF507438-7753-43E0-B8FC-AC1667EBCBE1}">
+              <a14:hiddenEffects xmlns:a14="http://schemas.microsoft.com/office/drawing/2010/main">
+                <a:effectLst>
+                  <a:outerShdw dist="35921" dir="2700000" algn="ctr" rotWithShape="0">
+                    <a:schemeClr val="bg2"/>
+                  </a:outerShdw>
+                </a:effectLst>
+              </a14:hiddenEffects>
+            </a:ext>
+          </a:extLst>
+        </p:spPr>
+        <p:txBody>
+          <a:bodyPr vert="horz" wrap="none" lIns="91440" tIns="45720" rIns="91440" bIns="45720" numCol="1" anchor="ctr" anchorCtr="0" compatLnSpc="1">
+            <a:prstTxWarp prst="textNoShape">
+              <a:avLst/>
+            </a:prstTxWarp>
+            <a:spAutoFit/>
+          </a:bodyPr>
+          <a:lstStyle/>
+          <a:p>
+            <a:pPr marL="0" marR="0" lvl="0" indent="0" algn="l" defTabSz="914400" rtl="0" eaLnBrk="0" fontAlgn="base" latinLnBrk="0" hangingPunct="0">
+              <a:lnSpc>
+                <a:spcPct val="100000"/>
+              </a:lnSpc>
+              <a:spcBef>
+                <a:spcPct val="0"/>
+              </a:spcBef>
+              <a:spcAft>
+                <a:spcPct val="0"/>
+              </a:spcAft>
+              <a:buClrTx/>
+              <a:buSzTx/>
+              <a:buFontTx/>
+              <a:buNone/>
+              <a:tabLst/>
+            </a:pPr>
+            <a:r>
+              <a:rPr kumimoji="0" lang="cs-CZ" altLang="cs-CZ" sz="1600" b="0" i="1" u="none" strike="noStrike" cap="none" normalizeH="0" baseline="0" dirty="0" err="1" smtClean="0">
+                <a:ln>
+                  <a:noFill/>
+                </a:ln>
+                <a:solidFill>
+                  <a:srgbClr val="000000"/>
+                </a:solidFill>
+                <a:effectLst/>
+                <a:latin typeface="Consolas" panose="020B0609020204030204" pitchFamily="49" charset="0"/>
+              </a:rPr>
+              <a:t>sequenceOf</a:t>
+            </a:r>
+            <a:r>
+              <a:rPr kumimoji="0" lang="cs-CZ" altLang="cs-CZ" sz="1600" b="0" i="0" u="none" strike="noStrike" cap="none" normalizeH="0" baseline="0" dirty="0" smtClean="0">
+                <a:ln>
+                  <a:noFill/>
+                </a:ln>
+                <a:solidFill>
+                  <a:srgbClr val="000000"/>
+                </a:solidFill>
+                <a:effectLst/>
+                <a:latin typeface="Consolas" panose="020B0609020204030204" pitchFamily="49" charset="0"/>
+              </a:rPr>
+              <a:t>(</a:t>
+            </a:r>
+            <a:r>
+              <a:rPr kumimoji="0" lang="cs-CZ" altLang="cs-CZ" sz="1600" b="0" i="0" u="none" strike="noStrike" cap="none" normalizeH="0" baseline="0" dirty="0" smtClean="0">
+                <a:ln>
+                  <a:noFill/>
+                </a:ln>
+                <a:solidFill>
+                  <a:srgbClr val="0000FF"/>
+                </a:solidFill>
+                <a:effectLst/>
+                <a:latin typeface="Consolas" panose="020B0609020204030204" pitchFamily="49" charset="0"/>
+              </a:rPr>
+              <a:t>1</a:t>
+            </a:r>
+            <a:r>
+              <a:rPr kumimoji="0" lang="cs-CZ" altLang="cs-CZ" sz="1600" b="0" i="0" u="none" strike="noStrike" cap="none" normalizeH="0" baseline="0" dirty="0" smtClean="0">
+                <a:ln>
+                  <a:noFill/>
+                </a:ln>
+                <a:solidFill>
+                  <a:srgbClr val="000000"/>
+                </a:solidFill>
+                <a:effectLst/>
+                <a:latin typeface="Consolas" panose="020B0609020204030204" pitchFamily="49" charset="0"/>
+              </a:rPr>
+              <a:t>,</a:t>
+            </a:r>
+            <a:r>
+              <a:rPr kumimoji="0" lang="cs-CZ" altLang="cs-CZ" sz="1600" b="0" i="0" u="none" strike="noStrike" cap="none" normalizeH="0" baseline="0" dirty="0" smtClean="0">
+                <a:ln>
+                  <a:noFill/>
+                </a:ln>
+                <a:solidFill>
+                  <a:srgbClr val="0000FF"/>
+                </a:solidFill>
+                <a:effectLst/>
+                <a:latin typeface="Consolas" panose="020B0609020204030204" pitchFamily="49" charset="0"/>
+              </a:rPr>
+              <a:t>2</a:t>
+            </a:r>
+            <a:r>
+              <a:rPr kumimoji="0" lang="cs-CZ" altLang="cs-CZ" sz="1600" b="0" i="0" u="none" strike="noStrike" cap="none" normalizeH="0" baseline="0" dirty="0" smtClean="0">
+                <a:ln>
+                  <a:noFill/>
+                </a:ln>
+                <a:solidFill>
+                  <a:srgbClr val="000000"/>
+                </a:solidFill>
+                <a:effectLst/>
+                <a:latin typeface="Consolas" panose="020B0609020204030204" pitchFamily="49" charset="0"/>
+              </a:rPr>
+              <a:t>,</a:t>
+            </a:r>
+            <a:r>
+              <a:rPr kumimoji="0" lang="cs-CZ" altLang="cs-CZ" sz="1600" b="0" i="0" u="none" strike="noStrike" cap="none" normalizeH="0" baseline="0" dirty="0" smtClean="0">
+                <a:ln>
+                  <a:noFill/>
+                </a:ln>
+                <a:solidFill>
+                  <a:srgbClr val="0000FF"/>
+                </a:solidFill>
+                <a:effectLst/>
+                <a:latin typeface="Consolas" panose="020B0609020204030204" pitchFamily="49" charset="0"/>
+              </a:rPr>
+              <a:t>3</a:t>
+            </a:r>
+            <a:r>
+              <a:rPr kumimoji="0" lang="cs-CZ" altLang="cs-CZ" sz="1600" b="0" i="0" u="none" strike="noStrike" cap="none" normalizeH="0" baseline="0" dirty="0" smtClean="0">
+                <a:ln>
+                  <a:noFill/>
+                </a:ln>
+                <a:solidFill>
+                  <a:srgbClr val="000000"/>
+                </a:solidFill>
+                <a:effectLst/>
+                <a:latin typeface="Consolas" panose="020B0609020204030204" pitchFamily="49" charset="0"/>
+              </a:rPr>
+              <a:t>,</a:t>
+            </a:r>
+            <a:r>
+              <a:rPr kumimoji="0" lang="cs-CZ" altLang="cs-CZ" sz="1600" b="0" i="0" u="none" strike="noStrike" cap="none" normalizeH="0" baseline="0" dirty="0" smtClean="0">
+                <a:ln>
+                  <a:noFill/>
+                </a:ln>
+                <a:solidFill>
+                  <a:srgbClr val="0000FF"/>
+                </a:solidFill>
+                <a:effectLst/>
+                <a:latin typeface="Consolas" panose="020B0609020204030204" pitchFamily="49" charset="0"/>
+              </a:rPr>
+              <a:t>4</a:t>
+            </a:r>
+            <a:r>
+              <a:rPr kumimoji="0" lang="cs-CZ" altLang="cs-CZ" sz="1600" b="0" i="0" u="none" strike="noStrike" cap="none" normalizeH="0" baseline="0" dirty="0" smtClean="0">
+                <a:ln>
+                  <a:noFill/>
+                </a:ln>
+                <a:solidFill>
+                  <a:srgbClr val="000000"/>
+                </a:solidFill>
+                <a:effectLst/>
+                <a:latin typeface="Consolas" panose="020B0609020204030204" pitchFamily="49" charset="0"/>
+              </a:rPr>
+              <a:t>)</a:t>
+            </a:r>
+            <a:endParaRPr kumimoji="0" lang="cs-CZ" altLang="cs-CZ" sz="1600" b="0" i="0" u="none" strike="noStrike" cap="none" normalizeH="0" baseline="0" dirty="0" smtClean="0">
+              <a:ln>
+                <a:noFill/>
+              </a:ln>
+              <a:solidFill>
+                <a:schemeClr val="tx1"/>
+              </a:solidFill>
+              <a:effectLst/>
+              <a:latin typeface="Arial" panose="020B0604020202020204" pitchFamily="34" charset="0"/>
+            </a:endParaRPr>
+          </a:p>
+        </p:txBody>
+      </p:sp>
+      <p:sp>
+        <p:nvSpPr>
+          <p:cNvPr id="5" name="Rectangle 2"/>
+          <p:cNvSpPr>
+            <a:spLocks noChangeArrowheads="1"/>
+          </p:cNvSpPr>
+          <p:nvPr/>
+        </p:nvSpPr>
+        <p:spPr bwMode="auto">
+          <a:xfrm>
+            <a:off x="323528" y="3861048"/>
+            <a:ext cx="3927656" cy="830997"/>
+          </a:xfrm>
+          <a:prstGeom prst="rect">
+            <a:avLst/>
+          </a:prstGeom>
+          <a:solidFill>
+            <a:srgbClr val="FFFFFF"/>
+          </a:solidFill>
+          <a:ln>
+            <a:noFill/>
+          </a:ln>
+          <a:effectLst/>
+          <a:extLst>
+            <a:ext uri="{91240B29-F687-4F45-9708-019B960494DF}">
+              <a14:hiddenLine xmlns:a14="http://schemas.microsoft.com/office/drawing/2010/main" w="9525">
+                <a:solidFill>
+                  <a:schemeClr val="tx1"/>
+                </a:solidFill>
+                <a:miter lim="800000"/>
+                <a:headEnd/>
+                <a:tailEnd/>
+              </a14:hiddenLine>
+            </a:ext>
+            <a:ext uri="{AF507438-7753-43E0-B8FC-AC1667EBCBE1}">
+              <a14:hiddenEffects xmlns:a14="http://schemas.microsoft.com/office/drawing/2010/main">
+                <a:effectLst>
+                  <a:outerShdw dist="35921" dir="2700000" algn="ctr" rotWithShape="0">
+                    <a:schemeClr val="bg2"/>
+                  </a:outerShdw>
+                </a:effectLst>
+              </a14:hiddenEffects>
+            </a:ext>
+          </a:extLst>
+        </p:spPr>
+        <p:txBody>
+          <a:bodyPr vert="horz" wrap="square" lIns="91440" tIns="45720" rIns="91440" bIns="45720" numCol="1" anchor="ctr" anchorCtr="0" compatLnSpc="1">
+            <a:prstTxWarp prst="textNoShape">
+              <a:avLst/>
+            </a:prstTxWarp>
+            <a:spAutoFit/>
+          </a:bodyPr>
+          <a:lstStyle/>
+          <a:p>
+            <a:pPr marL="0" marR="0" lvl="0" indent="0" algn="l" defTabSz="914400" rtl="0" eaLnBrk="0" fontAlgn="base" latinLnBrk="0" hangingPunct="0">
+              <a:lnSpc>
+                <a:spcPct val="100000"/>
+              </a:lnSpc>
+              <a:spcBef>
+                <a:spcPct val="0"/>
+              </a:spcBef>
+              <a:spcAft>
+                <a:spcPct val="0"/>
+              </a:spcAft>
+              <a:buClrTx/>
+              <a:buSzTx/>
+              <a:buFontTx/>
+              <a:buNone/>
+              <a:tabLst/>
+            </a:pPr>
+            <a:r>
+              <a:rPr kumimoji="0" lang="cs-CZ" altLang="cs-CZ" sz="1600" b="0" i="1" u="none" strike="noStrike" cap="none" normalizeH="0" baseline="0" dirty="0" err="1" smtClean="0">
+                <a:ln>
+                  <a:noFill/>
+                </a:ln>
+                <a:solidFill>
+                  <a:srgbClr val="000000"/>
+                </a:solidFill>
+                <a:effectLst/>
+                <a:latin typeface="Consolas" panose="020B0609020204030204" pitchFamily="49" charset="0"/>
+              </a:rPr>
+              <a:t>generateSequence</a:t>
+            </a:r>
+            <a:r>
+              <a:rPr kumimoji="0" lang="cs-CZ" altLang="cs-CZ" sz="1600" b="0" i="0" u="none" strike="noStrike" cap="none" normalizeH="0" baseline="0" dirty="0" smtClean="0">
+                <a:ln>
+                  <a:noFill/>
+                </a:ln>
+                <a:solidFill>
+                  <a:srgbClr val="000000"/>
+                </a:solidFill>
+                <a:effectLst/>
+                <a:latin typeface="Consolas" panose="020B0609020204030204" pitchFamily="49" charset="0"/>
+              </a:rPr>
+              <a:t>(</a:t>
+            </a:r>
+            <a:r>
+              <a:rPr kumimoji="0" lang="cs-CZ" altLang="cs-CZ" sz="1600" b="0" i="0" u="none" strike="noStrike" cap="none" normalizeH="0" baseline="0" dirty="0" smtClean="0">
+                <a:ln>
+                  <a:noFill/>
+                </a:ln>
+                <a:solidFill>
+                  <a:srgbClr val="0000FF"/>
+                </a:solidFill>
+                <a:effectLst/>
+                <a:latin typeface="Consolas" panose="020B0609020204030204" pitchFamily="49" charset="0"/>
+              </a:rPr>
+              <a:t>1</a:t>
+            </a:r>
+            <a:r>
+              <a:rPr kumimoji="0" lang="cs-CZ" altLang="cs-CZ" sz="1600" b="0" i="0" u="none" strike="noStrike" cap="none" normalizeH="0" baseline="0" dirty="0" smtClean="0">
+                <a:ln>
+                  <a:noFill/>
+                </a:ln>
+                <a:solidFill>
+                  <a:srgbClr val="000000"/>
+                </a:solidFill>
+                <a:effectLst/>
+                <a:latin typeface="Consolas" panose="020B0609020204030204" pitchFamily="49" charset="0"/>
+              </a:rPr>
+              <a:t>) </a:t>
+            </a:r>
+            <a:r>
+              <a:rPr kumimoji="0" lang="cs-CZ" altLang="cs-CZ" sz="1600" b="1" i="0" u="none" strike="noStrike" cap="none" normalizeH="0" baseline="0" dirty="0" smtClean="0">
+                <a:ln>
+                  <a:noFill/>
+                </a:ln>
+                <a:solidFill>
+                  <a:srgbClr val="000000"/>
+                </a:solidFill>
+                <a:effectLst/>
+                <a:latin typeface="Consolas" panose="020B0609020204030204" pitchFamily="49" charset="0"/>
+              </a:rPr>
+              <a:t>{ </a:t>
+            </a:r>
+            <a:r>
+              <a:rPr kumimoji="0" lang="cs-CZ" altLang="cs-CZ" sz="1600" b="1" i="0" u="none" strike="noStrike" cap="none" normalizeH="0" baseline="0" dirty="0" err="1" smtClean="0">
+                <a:ln>
+                  <a:noFill/>
+                </a:ln>
+                <a:solidFill>
+                  <a:srgbClr val="000000"/>
+                </a:solidFill>
+                <a:effectLst/>
+                <a:latin typeface="Consolas" panose="020B0609020204030204" pitchFamily="49" charset="0"/>
+              </a:rPr>
+              <a:t>it</a:t>
+            </a:r>
+            <a:r>
+              <a:rPr kumimoji="0" lang="cs-CZ" altLang="cs-CZ" sz="1600" b="1" i="0" u="none" strike="noStrike" cap="none" normalizeH="0" baseline="0" dirty="0" smtClean="0">
+                <a:ln>
+                  <a:noFill/>
+                </a:ln>
+                <a:solidFill>
+                  <a:srgbClr val="000000"/>
+                </a:solidFill>
+                <a:effectLst/>
+                <a:latin typeface="Consolas" panose="020B0609020204030204" pitchFamily="49" charset="0"/>
+              </a:rPr>
+              <a:t> </a:t>
+            </a:r>
+            <a:r>
+              <a:rPr kumimoji="0" lang="cs-CZ" altLang="cs-CZ" sz="1600" b="0" i="0" u="none" strike="noStrike" cap="none" normalizeH="0" baseline="0" dirty="0" smtClean="0">
+                <a:ln>
+                  <a:noFill/>
+                </a:ln>
+                <a:solidFill>
+                  <a:srgbClr val="000000"/>
+                </a:solidFill>
+                <a:effectLst/>
+                <a:latin typeface="Consolas" panose="020B0609020204030204" pitchFamily="49" charset="0"/>
+              </a:rPr>
+              <a:t>+ </a:t>
+            </a:r>
+            <a:r>
+              <a:rPr kumimoji="0" lang="cs-CZ" altLang="cs-CZ" sz="1600" b="0" i="0" u="none" strike="noStrike" cap="none" normalizeH="0" baseline="0" dirty="0" smtClean="0">
+                <a:ln>
+                  <a:noFill/>
+                </a:ln>
+                <a:solidFill>
+                  <a:srgbClr val="0000FF"/>
+                </a:solidFill>
+                <a:effectLst/>
+                <a:latin typeface="Consolas" panose="020B0609020204030204" pitchFamily="49" charset="0"/>
+              </a:rPr>
+              <a:t>1 </a:t>
+            </a:r>
+            <a:r>
+              <a:rPr kumimoji="0" lang="cs-CZ" altLang="cs-CZ" sz="1600" b="1" i="0" u="none" strike="noStrike" cap="none" normalizeH="0" baseline="0" dirty="0" smtClean="0">
+                <a:ln>
+                  <a:noFill/>
+                </a:ln>
+                <a:solidFill>
+                  <a:srgbClr val="000000"/>
+                </a:solidFill>
+                <a:effectLst/>
+                <a:latin typeface="Consolas" panose="020B0609020204030204" pitchFamily="49" charset="0"/>
+              </a:rPr>
+              <a:t>}</a:t>
+            </a:r>
+            <a:br>
+              <a:rPr kumimoji="0" lang="cs-CZ" altLang="cs-CZ" sz="1600" b="1" i="0" u="none" strike="noStrike" cap="none" normalizeH="0" baseline="0" dirty="0" smtClean="0">
+                <a:ln>
+                  <a:noFill/>
+                </a:ln>
+                <a:solidFill>
+                  <a:srgbClr val="000000"/>
+                </a:solidFill>
+                <a:effectLst/>
+                <a:latin typeface="Consolas" panose="020B0609020204030204" pitchFamily="49" charset="0"/>
+              </a:rPr>
+            </a:br>
+            <a:r>
+              <a:rPr kumimoji="0" lang="cs-CZ" altLang="cs-CZ" sz="1600" b="1" i="0" u="none" strike="noStrike" cap="none" normalizeH="0" baseline="0" dirty="0" smtClean="0">
+                <a:ln>
+                  <a:noFill/>
+                </a:ln>
+                <a:solidFill>
+                  <a:srgbClr val="000000"/>
+                </a:solidFill>
+                <a:effectLst/>
+                <a:latin typeface="Consolas" panose="020B0609020204030204" pitchFamily="49" charset="0"/>
+              </a:rPr>
+              <a:t>        </a:t>
+            </a:r>
+            <a:r>
+              <a:rPr kumimoji="0" lang="cs-CZ" altLang="cs-CZ" sz="1600" b="0" i="0" u="none" strike="noStrike" cap="none" normalizeH="0" baseline="0" dirty="0" smtClean="0">
+                <a:ln>
+                  <a:noFill/>
+                </a:ln>
+                <a:solidFill>
+                  <a:srgbClr val="000000"/>
+                </a:solidFill>
+                <a:effectLst/>
+                <a:latin typeface="Consolas" panose="020B0609020204030204" pitchFamily="49" charset="0"/>
+              </a:rPr>
+              <a:t>.</a:t>
+            </a:r>
+            <a:r>
+              <a:rPr kumimoji="0" lang="cs-CZ" altLang="cs-CZ" sz="1600" b="0" i="1" u="none" strike="noStrike" cap="none" normalizeH="0" baseline="0" dirty="0" err="1" smtClean="0">
+                <a:ln>
+                  <a:noFill/>
+                </a:ln>
+                <a:solidFill>
+                  <a:srgbClr val="000000"/>
+                </a:solidFill>
+                <a:effectLst/>
+                <a:latin typeface="Consolas" panose="020B0609020204030204" pitchFamily="49" charset="0"/>
+              </a:rPr>
+              <a:t>take</a:t>
+            </a:r>
+            <a:r>
+              <a:rPr kumimoji="0" lang="cs-CZ" altLang="cs-CZ" sz="1600" b="0" i="0" u="none" strike="noStrike" cap="none" normalizeH="0" baseline="0" dirty="0" smtClean="0">
+                <a:ln>
+                  <a:noFill/>
+                </a:ln>
+                <a:solidFill>
+                  <a:srgbClr val="000000"/>
+                </a:solidFill>
+                <a:effectLst/>
+                <a:latin typeface="Consolas" panose="020B0609020204030204" pitchFamily="49" charset="0"/>
+              </a:rPr>
+              <a:t>(</a:t>
+            </a:r>
+            <a:r>
+              <a:rPr kumimoji="0" lang="cs-CZ" altLang="cs-CZ" sz="1600" b="0" i="0" u="none" strike="noStrike" cap="none" normalizeH="0" baseline="0" dirty="0" smtClean="0">
+                <a:ln>
+                  <a:noFill/>
+                </a:ln>
+                <a:solidFill>
+                  <a:srgbClr val="0000FF"/>
+                </a:solidFill>
+                <a:effectLst/>
+                <a:latin typeface="Consolas" panose="020B0609020204030204" pitchFamily="49" charset="0"/>
+              </a:rPr>
+              <a:t>10</a:t>
+            </a:r>
+            <a:r>
+              <a:rPr kumimoji="0" lang="cs-CZ" altLang="cs-CZ" sz="1600" b="0" i="0" u="none" strike="noStrike" cap="none" normalizeH="0" baseline="0" dirty="0" smtClean="0">
+                <a:ln>
+                  <a:noFill/>
+                </a:ln>
+                <a:solidFill>
+                  <a:srgbClr val="000000"/>
+                </a:solidFill>
+                <a:effectLst/>
+                <a:latin typeface="Consolas" panose="020B0609020204030204" pitchFamily="49" charset="0"/>
+              </a:rPr>
+              <a:t>)</a:t>
+            </a:r>
+            <a:br>
+              <a:rPr kumimoji="0" lang="cs-CZ" altLang="cs-CZ" sz="1600" b="0" i="0" u="none" strike="noStrike" cap="none" normalizeH="0" baseline="0" dirty="0" smtClean="0">
+                <a:ln>
+                  <a:noFill/>
+                </a:ln>
+                <a:solidFill>
+                  <a:srgbClr val="000000"/>
+                </a:solidFill>
+                <a:effectLst/>
+                <a:latin typeface="Consolas" panose="020B0609020204030204" pitchFamily="49" charset="0"/>
+              </a:rPr>
+            </a:br>
+            <a:r>
+              <a:rPr kumimoji="0" lang="cs-CZ" altLang="cs-CZ" sz="1600" b="0" i="0" u="none" strike="noStrike" cap="none" normalizeH="0" baseline="0" dirty="0" smtClean="0">
+                <a:ln>
+                  <a:noFill/>
+                </a:ln>
+                <a:solidFill>
+                  <a:srgbClr val="000000"/>
+                </a:solidFill>
+                <a:effectLst/>
+                <a:latin typeface="Consolas" panose="020B0609020204030204" pitchFamily="49" charset="0"/>
+              </a:rPr>
+              <a:t>        .</a:t>
+            </a:r>
+            <a:r>
+              <a:rPr kumimoji="0" lang="cs-CZ" altLang="cs-CZ" sz="1600" b="0" i="1" u="none" strike="noStrike" cap="none" normalizeH="0" baseline="0" dirty="0" err="1" smtClean="0">
+                <a:ln>
+                  <a:noFill/>
+                </a:ln>
+                <a:solidFill>
+                  <a:srgbClr val="000000"/>
+                </a:solidFill>
+                <a:effectLst/>
+                <a:latin typeface="Consolas" panose="020B0609020204030204" pitchFamily="49" charset="0"/>
+              </a:rPr>
+              <a:t>forEach</a:t>
+            </a:r>
+            <a:r>
+              <a:rPr kumimoji="0" lang="cs-CZ" altLang="cs-CZ" sz="1600" b="0" i="1" u="none" strike="noStrike" cap="none" normalizeH="0" baseline="0" dirty="0" smtClean="0">
+                <a:ln>
+                  <a:noFill/>
+                </a:ln>
+                <a:solidFill>
+                  <a:srgbClr val="000000"/>
+                </a:solidFill>
+                <a:effectLst/>
+                <a:latin typeface="Consolas" panose="020B0609020204030204" pitchFamily="49" charset="0"/>
+              </a:rPr>
+              <a:t> </a:t>
+            </a:r>
+            <a:r>
+              <a:rPr kumimoji="0" lang="cs-CZ" altLang="cs-CZ" sz="1600" b="1" i="0" u="none" strike="noStrike" cap="none" normalizeH="0" baseline="0" dirty="0" smtClean="0">
+                <a:ln>
+                  <a:noFill/>
+                </a:ln>
+                <a:solidFill>
+                  <a:srgbClr val="000000"/>
+                </a:solidFill>
+                <a:effectLst/>
+                <a:latin typeface="Consolas" panose="020B0609020204030204" pitchFamily="49" charset="0"/>
+              </a:rPr>
+              <a:t>{ </a:t>
+            </a:r>
+            <a:r>
+              <a:rPr kumimoji="0" lang="cs-CZ" altLang="cs-CZ" sz="1600" b="1" i="0" u="none" strike="noStrike" cap="none" normalizeH="0" baseline="0" dirty="0" err="1" smtClean="0">
+                <a:ln>
+                  <a:noFill/>
+                </a:ln>
+                <a:solidFill>
+                  <a:srgbClr val="000000"/>
+                </a:solidFill>
+                <a:effectLst/>
+                <a:latin typeface="Consolas" panose="020B0609020204030204" pitchFamily="49" charset="0"/>
+              </a:rPr>
+              <a:t>it</a:t>
+            </a:r>
+            <a:r>
+              <a:rPr kumimoji="0" lang="cs-CZ" altLang="cs-CZ" sz="1600" b="1" i="0" u="none" strike="noStrike" cap="none" normalizeH="0" baseline="0" dirty="0" smtClean="0">
+                <a:ln>
+                  <a:noFill/>
+                </a:ln>
+                <a:solidFill>
+                  <a:srgbClr val="000000"/>
+                </a:solidFill>
+                <a:effectLst/>
+                <a:latin typeface="Consolas" panose="020B0609020204030204" pitchFamily="49" charset="0"/>
+              </a:rPr>
+              <a:t> }</a:t>
+            </a:r>
+            <a:endParaRPr kumimoji="0" lang="cs-CZ" altLang="cs-CZ" sz="1600" b="0" i="0" u="none" strike="noStrike" cap="none" normalizeH="0" baseline="0" dirty="0" smtClean="0">
+              <a:ln>
+                <a:noFill/>
+              </a:ln>
+              <a:solidFill>
+                <a:schemeClr val="tx1"/>
+              </a:solidFill>
+              <a:effectLst/>
+              <a:latin typeface="Arial" panose="020B0604020202020204" pitchFamily="34" charset="0"/>
+            </a:endParaRPr>
+          </a:p>
+        </p:txBody>
+      </p:sp>
+    </p:spTree>
+    <p:extLst>
+      <p:ext uri="{BB962C8B-B14F-4D97-AF65-F5344CB8AC3E}">
+        <p14:creationId xmlns:p14="http://schemas.microsoft.com/office/powerpoint/2010/main" val="523084205"/>
+      </p:ext>
+    </p:extLst>
+  </p:cSld>
+  <p:clrMapOvr>
+    <a:masterClrMapping/>
+  </p:clrMapOvr>
+</p:sld>
+</file>
+
+<file path=ppt/slides/slide11.xml><?xml version="1.0" encoding="utf-8"?>
+<p:sld xmlns:a="http://schemas.openxmlformats.org/drawingml/2006/main" xmlns:r="http://schemas.openxmlformats.org/officeDocument/2006/relationships" xmlns:p="http://schemas.openxmlformats.org/presentationml/2006/main">
+  <p:cSld>
+    <p:spTree>
+      <p:nvGrpSpPr>
+        <p:cNvPr id="1" name=""/>
+        <p:cNvGrpSpPr/>
+        <p:nvPr/>
+      </p:nvGrpSpPr>
+      <p:grpSpPr>
+        <a:xfrm>
+          <a:off x="0" y="0"/>
+          <a:ext cx="0" cy="0"/>
+          <a:chOff x="0" y="0"/>
+          <a:chExt cx="0" cy="0"/>
+        </a:xfrm>
+      </p:grpSpPr>
+      <p:sp>
+        <p:nvSpPr>
           <p:cNvPr id="4" name="Nadpis 3"/>
           <p:cNvSpPr>
             <a:spLocks noGrp="1"/>
@@ -9625,7 +10367,7 @@
 </p:sld>
 </file>
 
-<file path=ppt/slides/slide11.xml><?xml version="1.0" encoding="utf-8"?>
+<file path=ppt/slides/slide12.xml><?xml version="1.0" encoding="utf-8"?>
 <p:sld xmlns:a="http://schemas.openxmlformats.org/drawingml/2006/main" xmlns:r="http://schemas.openxmlformats.org/officeDocument/2006/relationships" xmlns:p="http://schemas.openxmlformats.org/presentationml/2006/main">
   <p:cSld>
     <p:spTree>
@@ -15345,71 +16087,13 @@
             </a:r>
             <a:r>
               <a:rPr lang="cs-CZ" dirty="0" smtClean="0"/>
-              <a:t> být dost pomalé</a:t>
+              <a:t> být dost </a:t>
+            </a:r>
+            <a:r>
+              <a:rPr lang="cs-CZ" dirty="0" smtClean="0"/>
+              <a:t>pomalé</a:t>
             </a:r>
             <a:endParaRPr lang="en-US" dirty="0"/>
-          </a:p>
-          <a:p>
-            <a:r>
-              <a:rPr lang="en-US" dirty="0" err="1" smtClean="0"/>
-              <a:t>Vytvo</a:t>
-            </a:r>
-            <a:r>
-              <a:rPr lang="cs-CZ" dirty="0" err="1" smtClean="0"/>
-              <a:t>ření</a:t>
-            </a:r>
-            <a:endParaRPr lang="cs-CZ" dirty="0" smtClean="0"/>
-          </a:p>
-          <a:p>
-            <a:pPr lvl="1"/>
-            <a:r>
-              <a:rPr lang="cs-CZ" dirty="0" err="1" smtClean="0"/>
-              <a:t>sequenceOf</a:t>
-            </a:r>
-            <a:endParaRPr lang="en-US" dirty="0"/>
-          </a:p>
-          <a:p>
-            <a:pPr lvl="1"/>
-            <a:r>
-              <a:rPr lang="cs-CZ" dirty="0" err="1" smtClean="0"/>
-              <a:t>asSequence</a:t>
-            </a:r>
-            <a:endParaRPr lang="cs-CZ" dirty="0" smtClean="0"/>
-          </a:p>
-          <a:p>
-            <a:pPr lvl="1"/>
-            <a:r>
-              <a:rPr lang="cs-CZ" dirty="0" err="1" smtClean="0"/>
-              <a:t>generateSequence</a:t>
-            </a:r>
-            <a:r>
-              <a:rPr lang="en-US" dirty="0" smtClean="0"/>
-              <a:t>(</a:t>
-            </a:r>
-            <a:r>
-              <a:rPr lang="fr-FR" dirty="0"/>
-              <a:t>seed: T?, nextFunction: (T) -&gt; T?</a:t>
-            </a:r>
-            <a:r>
-              <a:rPr lang="en-US" dirty="0" smtClean="0"/>
-              <a:t>)</a:t>
-            </a:r>
-            <a:r>
-              <a:rPr lang="cs-CZ" dirty="0"/>
-              <a:t> : </a:t>
-            </a:r>
-            <a:r>
-              <a:rPr lang="cs-CZ" dirty="0" err="1"/>
-              <a:t>Sequence</a:t>
-            </a:r>
-            <a:r>
-              <a:rPr lang="cs-CZ" dirty="0"/>
-              <a:t>&lt;T&gt;</a:t>
-            </a:r>
-            <a:endParaRPr lang="cs-CZ" dirty="0" smtClean="0"/>
-          </a:p>
-          <a:p>
-            <a:endParaRPr lang="cs-CZ" dirty="0"/>
           </a:p>
         </p:txBody>
       </p:sp>

</xml_diff>

<commit_message>
kotlin advanced - note added
</commit_message>
<xml_diff>
--- a/slides/Kotlin - 3. Collections.pptx
+++ b/slides/Kotlin - 3. Collections.pptx
@@ -1795,6 +1795,103 @@
     <p:extLst>
       <p:ext uri="{BB962C8B-B14F-4D97-AF65-F5344CB8AC3E}">
         <p14:creationId xmlns:p14="http://schemas.microsoft.com/office/powerpoint/2010/main" val="2526667534"/>
+      </p:ext>
+    </p:extLst>
+  </p:cSld>
+  <p:clrMapOvr>
+    <a:masterClrMapping/>
+  </p:clrMapOvr>
+</p:notes>
+</file>
+
+<file path=ppt/notesSlides/notesSlide9.xml><?xml version="1.0" encoding="utf-8"?>
+<p:notes xmlns:a="http://schemas.openxmlformats.org/drawingml/2006/main" xmlns:r="http://schemas.openxmlformats.org/officeDocument/2006/relationships" xmlns:p="http://schemas.openxmlformats.org/presentationml/2006/main">
+  <p:cSld>
+    <p:spTree>
+      <p:nvGrpSpPr>
+        <p:cNvPr id="1" name=""/>
+        <p:cNvGrpSpPr/>
+        <p:nvPr/>
+      </p:nvGrpSpPr>
+      <p:grpSpPr>
+        <a:xfrm>
+          <a:off x="0" y="0"/>
+          <a:ext cx="0" cy="0"/>
+          <a:chOff x="0" y="0"/>
+          <a:chExt cx="0" cy="0"/>
+        </a:xfrm>
+      </p:grpSpPr>
+      <p:sp>
+        <p:nvSpPr>
+          <p:cNvPr id="2" name="Zástupný symbol pro obrázek snímku 1"/>
+          <p:cNvSpPr>
+            <a:spLocks noGrp="1" noRot="1" noChangeAspect="1"/>
+          </p:cNvSpPr>
+          <p:nvPr>
+            <p:ph type="sldImg"/>
+          </p:nvPr>
+        </p:nvSpPr>
+        <p:spPr/>
+      </p:sp>
+      <p:sp>
+        <p:nvSpPr>
+          <p:cNvPr id="3" name="Zástupný symbol pro poznámky 2"/>
+          <p:cNvSpPr>
+            <a:spLocks noGrp="1"/>
+          </p:cNvSpPr>
+          <p:nvPr>
+            <p:ph type="body" idx="1"/>
+          </p:nvPr>
+        </p:nvSpPr>
+        <p:spPr/>
+        <p:txBody>
+          <a:bodyPr/>
+          <a:lstStyle/>
+          <a:p>
+            <a:r>
+              <a:rPr lang="en-US" dirty="0" smtClean="0"/>
+              <a:t>Sequence processing is generally faster</a:t>
+            </a:r>
+            <a:r>
+              <a:rPr lang="en-US" baseline="0" dirty="0" smtClean="0"/>
+              <a:t> than direct collection processing when we have more than one </a:t>
+            </a:r>
+            <a:r>
+              <a:rPr lang="en-US" baseline="0" smtClean="0"/>
+              <a:t>processing step</a:t>
+            </a:r>
+            <a:endParaRPr lang="cs-CZ"/>
+          </a:p>
+        </p:txBody>
+      </p:sp>
+      <p:sp>
+        <p:nvSpPr>
+          <p:cNvPr id="4" name="Zástupný symbol pro číslo snímku 3"/>
+          <p:cNvSpPr>
+            <a:spLocks noGrp="1"/>
+          </p:cNvSpPr>
+          <p:nvPr>
+            <p:ph type="sldNum" sz="quarter" idx="10"/>
+          </p:nvPr>
+        </p:nvSpPr>
+        <p:spPr/>
+        <p:txBody>
+          <a:bodyPr/>
+          <a:lstStyle/>
+          <a:p>
+            <a:fld id="{27886F17-B5D0-472B-8745-C3F2BDEA3FAA}" type="slidenum">
+              <a:rPr lang="cs-CZ" smtClean="0"/>
+              <a:pPr/>
+              <a:t>10</a:t>
+            </a:fld>
+            <a:endParaRPr lang="cs-CZ"/>
+          </a:p>
+        </p:txBody>
+      </p:sp>
+    </p:spTree>
+    <p:extLst>
+      <p:ext uri="{BB962C8B-B14F-4D97-AF65-F5344CB8AC3E}">
+        <p14:creationId xmlns:p14="http://schemas.microsoft.com/office/powerpoint/2010/main" val="2338268925"/>
       </p:ext>
     </p:extLst>
   </p:cSld>
@@ -16087,11 +16184,7 @@
             </a:r>
             <a:r>
               <a:rPr lang="cs-CZ" dirty="0" smtClean="0"/>
-              <a:t> být dost </a:t>
-            </a:r>
-            <a:r>
-              <a:rPr lang="cs-CZ" dirty="0" smtClean="0"/>
-              <a:t>pomalé</a:t>
+              <a:t> být dost pomalé</a:t>
             </a:r>
             <a:endParaRPr lang="en-US" dirty="0"/>
           </a:p>

</xml_diff>